<commit_message>
Testing in Final Presentation
</commit_message>
<xml_diff>
--- a/Final Presentation/Ink3d Final Presentation.pptx
+++ b/Final Presentation/Ink3d Final Presentation.pptx
@@ -141,7 +141,7 @@
   </p:defaultTextStyle>
   <p:extLst>
     <p:ext uri="{EFAFB233-063F-42B5-8137-9DF3F51BA10A}">
-      <p15:sldGuideLst xmlns:p15="http://schemas.microsoft.com/office/powerpoint/2012/main" xmlns="">
+      <p15:sldGuideLst xmlns:p15="http://schemas.microsoft.com/office/powerpoint/2012/main">
         <p15:guide id="1" orient="horz" pos="2160">
           <p15:clr>
             <a:srgbClr val="A4A3A4"/>
@@ -2133,13 +2133,12 @@
           <c:showPercent val="0"/>
           <c:showBubbleSize val="0"/>
         </c:dLbls>
-        <c:marker val="1"/>
         <c:smooth val="0"/>
-        <c:axId val="109736704"/>
-        <c:axId val="109738240"/>
+        <c:axId val="219722768"/>
+        <c:axId val="249477536"/>
       </c:lineChart>
       <c:dateAx>
-        <c:axId val="109736704"/>
+        <c:axId val="219722768"/>
         <c:scaling>
           <c:orientation val="minMax"/>
         </c:scaling>
@@ -2149,14 +2148,14 @@
         <c:majorTickMark val="out"/>
         <c:minorTickMark val="none"/>
         <c:tickLblPos val="nextTo"/>
-        <c:crossAx val="109738240"/>
+        <c:crossAx val="249477536"/>
         <c:crosses val="autoZero"/>
         <c:auto val="1"/>
         <c:lblOffset val="100"/>
         <c:baseTimeUnit val="days"/>
       </c:dateAx>
       <c:valAx>
-        <c:axId val="109738240"/>
+        <c:axId val="249477536"/>
         <c:scaling>
           <c:orientation val="minMax"/>
         </c:scaling>
@@ -2167,14 +2166,13 @@
         <c:majorTickMark val="out"/>
         <c:minorTickMark val="none"/>
         <c:tickLblPos val="nextTo"/>
-        <c:crossAx val="109736704"/>
+        <c:crossAx val="219722768"/>
         <c:crosses val="autoZero"/>
         <c:crossBetween val="between"/>
       </c:valAx>
     </c:plotArea>
     <c:legend>
       <c:legendPos val="r"/>
-      <c:layout/>
       <c:overlay val="0"/>
     </c:legend>
     <c:plotVisOnly val="1"/>
@@ -6719,12 +6717,12 @@
           <a:graphicData uri="http://schemas.openxmlformats.org/presentationml/2006/ole">
             <mc:AlternateContent xmlns:mc="http://schemas.openxmlformats.org/markup-compatibility/2006">
               <mc:Choice xmlns:v="urn:schemas-microsoft-com:vml" Requires="v">
-                <p:oleObj spid="_x0000_s1036" name="Visio" r:id="rId4" imgW="7343730" imgH="9410580" progId="Visio.Drawing.15">
+                <p:oleObj spid="_x0000_s1038" name="Visio" r:id="rId3" imgW="7343730" imgH="9410580" progId="Visio.Drawing.15">
                   <p:embed/>
                 </p:oleObj>
               </mc:Choice>
               <mc:Fallback>
-                <p:oleObj name="Visio" r:id="rId4" imgW="7343730" imgH="9410580" progId="Visio.Drawing.15">
+                <p:oleObj name="Visio" r:id="rId3" imgW="7343730" imgH="9410580" progId="Visio.Drawing.15">
                   <p:embed/>
                   <p:pic>
                     <p:nvPicPr>
@@ -6735,7 +6733,7 @@
                       <p:nvPr/>
                     </p:nvPicPr>
                     <p:blipFill>
-                      <a:blip r:embed="rId5"/>
+                      <a:blip r:embed="rId4"/>
                       <a:srcRect/>
                       <a:stretch>
                         <a:fillRect/>
@@ -7019,12 +7017,12 @@
           <a:graphicData uri="http://schemas.openxmlformats.org/presentationml/2006/ole">
             <mc:AlternateContent xmlns:mc="http://schemas.openxmlformats.org/markup-compatibility/2006">
               <mc:Choice xmlns:v="urn:schemas-microsoft-com:vml" Requires="v">
-                <p:oleObj spid="_x0000_s2060" name="Visio" r:id="rId4" imgW="7534278" imgH="9677340" progId="Visio.Drawing.15">
+                <p:oleObj spid="_x0000_s2062" name="Visio" r:id="rId3" imgW="7534278" imgH="9677340" progId="Visio.Drawing.15">
                   <p:embed/>
                 </p:oleObj>
               </mc:Choice>
               <mc:Fallback>
-                <p:oleObj name="Visio" r:id="rId4" imgW="7534278" imgH="9677340" progId="Visio.Drawing.15">
+                <p:oleObj name="Visio" r:id="rId3" imgW="7534278" imgH="9677340" progId="Visio.Drawing.15">
                   <p:embed/>
                   <p:pic>
                     <p:nvPicPr>
@@ -7035,7 +7033,7 @@
                       <p:nvPr/>
                     </p:nvPicPr>
                     <p:blipFill>
-                      <a:blip r:embed="rId5">
+                      <a:blip r:embed="rId4">
                         <a:extLst>
                           <a:ext uri="{28A0092B-C50C-407E-A947-70E740481C1C}">
                             <a14:useLocalDpi xmlns:a14="http://schemas.microsoft.com/office/drawing/2010/main" val="0"/>
@@ -8012,11 +8010,7 @@
           <a:p>
             <a:r>
               <a:rPr lang="en-US" dirty="0" smtClean="0"/>
-              <a:t>Oversight </a:t>
-            </a:r>
-            <a:r>
-              <a:rPr lang="en-US" dirty="0" smtClean="0"/>
-              <a:t>– Dr. </a:t>
+              <a:t>Oversight – Dr. </a:t>
             </a:r>
             <a:r>
               <a:rPr lang="en-US" dirty="0" err="1" smtClean="0"/>
@@ -10799,7 +10793,7 @@
             <p:ph idx="1"/>
             <p:extLst>
               <p:ext uri="{D42A27DB-BD31-4B8C-83A1-F6EECF244321}">
-                <p14:modId xmlns:p14="http://schemas.microsoft.com/office/powerpoint/2010/main" val="227400233"/>
+                <p14:modId xmlns:p14="http://schemas.microsoft.com/office/powerpoint/2010/main" val="2740401575"/>
               </p:ext>
             </p:extLst>
           </p:nvPr>
@@ -10918,6 +10912,10 @@
                     <a:lstStyle/>
                     <a:p>
                       <a:pPr algn="ctr"/>
+                      <a:r>
+                        <a:rPr lang="en-US" sz="2000" dirty="0" smtClean="0"/>
+                        <a:t>100%</a:t>
+                      </a:r>
                       <a:endParaRPr lang="en-US" sz="2000" dirty="0"/>
                     </a:p>
                   </a:txBody>
@@ -10929,6 +10927,10 @@
                     <a:lstStyle/>
                     <a:p>
                       <a:pPr algn="ctr"/>
+                      <a:r>
+                        <a:rPr lang="en-US" sz="2000" dirty="0" smtClean="0"/>
+                        <a:t>Pass</a:t>
+                      </a:r>
                       <a:endParaRPr lang="en-US" sz="2000" dirty="0"/>
                     </a:p>
                   </a:txBody>
@@ -10975,6 +10977,10 @@
                     <a:lstStyle/>
                     <a:p>
                       <a:pPr algn="ctr"/>
+                      <a:r>
+                        <a:rPr lang="en-US" sz="2000" dirty="0" smtClean="0"/>
+                        <a:t>100%</a:t>
+                      </a:r>
                       <a:endParaRPr lang="en-US" sz="2000" dirty="0"/>
                     </a:p>
                   </a:txBody>
@@ -10986,6 +10992,10 @@
                     <a:lstStyle/>
                     <a:p>
                       <a:pPr algn="ctr"/>
+                      <a:r>
+                        <a:rPr lang="en-US" sz="2000" dirty="0" smtClean="0"/>
+                        <a:t>Pass</a:t>
+                      </a:r>
                       <a:endParaRPr lang="en-US" sz="2000" dirty="0"/>
                     </a:p>
                   </a:txBody>
@@ -11032,6 +11042,10 @@
                     <a:lstStyle/>
                     <a:p>
                       <a:pPr algn="ctr"/>
+                      <a:r>
+                        <a:rPr lang="en-US" sz="2000" dirty="0" smtClean="0"/>
+                        <a:t>100%</a:t>
+                      </a:r>
                       <a:endParaRPr lang="en-US" sz="2000" dirty="0"/>
                     </a:p>
                   </a:txBody>
@@ -11043,6 +11057,10 @@
                     <a:lstStyle/>
                     <a:p>
                       <a:pPr algn="ctr"/>
+                      <a:r>
+                        <a:rPr lang="en-US" sz="2000" dirty="0" smtClean="0"/>
+                        <a:t>Pass</a:t>
+                      </a:r>
                       <a:endParaRPr lang="en-US" sz="2000" dirty="0"/>
                     </a:p>
                   </a:txBody>
@@ -11097,6 +11115,10 @@
                     <a:lstStyle/>
                     <a:p>
                       <a:pPr algn="ctr"/>
+                      <a:r>
+                        <a:rPr lang="en-US" sz="2000" dirty="0" smtClean="0"/>
+                        <a:t>100%</a:t>
+                      </a:r>
                       <a:endParaRPr lang="en-US" sz="2000" dirty="0"/>
                     </a:p>
                   </a:txBody>
@@ -11108,6 +11130,10 @@
                     <a:lstStyle/>
                     <a:p>
                       <a:pPr algn="ctr"/>
+                      <a:r>
+                        <a:rPr lang="en-US" sz="2000" dirty="0" smtClean="0"/>
+                        <a:t>Pass</a:t>
+                      </a:r>
                       <a:endParaRPr lang="en-US" sz="2000" dirty="0"/>
                     </a:p>
                   </a:txBody>
@@ -11150,6 +11176,10 @@
                     <a:lstStyle/>
                     <a:p>
                       <a:pPr algn="ctr"/>
+                      <a:r>
+                        <a:rPr lang="en-US" sz="2000" dirty="0" smtClean="0"/>
+                        <a:t>30%</a:t>
+                      </a:r>
                       <a:endParaRPr lang="en-US" sz="2000" dirty="0"/>
                     </a:p>
                   </a:txBody>
@@ -11161,6 +11191,10 @@
                     <a:lstStyle/>
                     <a:p>
                       <a:pPr algn="ctr"/>
+                      <a:r>
+                        <a:rPr lang="en-US" sz="2000" dirty="0" smtClean="0"/>
+                        <a:t>Fail</a:t>
+                      </a:r>
                       <a:endParaRPr lang="en-US" sz="2000" dirty="0"/>
                     </a:p>
                   </a:txBody>

</xml_diff>